<commit_message>
Reword explanation of commit parents.
</commit_message>
<xml_diff>
--- a/Understanding Git.pptx
+++ b/Understanding Git.pptx
@@ -332,7 +332,7 @@
           <a:p>
             <a:fld id="{F4080581-B884-4DED-8C24-91F8CB72B4A0}" type="datetimeFigureOut">
               <a:rPr lang="en-US" smtClean="0"/>
-              <a:t>4/13/2017</a:t>
+              <a:t>4/18/2017</a:t>
             </a:fld>
             <a:endParaRPr lang="en-US"/>
           </a:p>
@@ -497,7 +497,7 @@
           <a:p>
             <a:fld id="{9ABF0964-4CF0-414C-A591-67AEF23FDB8A}" type="datetimeFigureOut">
               <a:rPr lang="en-US" smtClean="0"/>
-              <a:t>4/13/2017</a:t>
+              <a:t>4/18/2017</a:t>
             </a:fld>
             <a:endParaRPr lang="en-US"/>
           </a:p>
@@ -4922,21 +4922,21 @@
             </a:pPr>
             <a:r>
               <a:rPr lang="en-US" dirty="0"/>
-              <a:t>A commit can have parents.</a:t>
+              <a:t>Commits have parents.</a:t>
             </a:r>
           </a:p>
           <a:p>
             <a:pPr lvl="1"/>
             <a:r>
               <a:rPr lang="en-US" dirty="0"/>
-              <a:t>Every commit except the first commit in your repository has at least one parent.</a:t>
+              <a:t>A parent is just the snapshot(s) prior to current one.</a:t>
             </a:r>
           </a:p>
           <a:p>
             <a:pPr lvl="1"/>
             <a:r>
               <a:rPr lang="en-US" dirty="0"/>
-              <a:t>A commit with multiple parents is a merge commit.</a:t>
+              <a:t>A commit with multiple parents is a merge commit. It combines the changes in both of its parents.</a:t>
             </a:r>
           </a:p>
           <a:p>

</xml_diff>

<commit_message>
Expand on the brief "set up Unity SmartMerge" section.
</commit_message>
<xml_diff>
--- a/Understanding Git.pptx
+++ b/Understanding Git.pptx
@@ -8451,7 +8451,7 @@
         </p:spPr>
         <p:txBody>
           <a:bodyPr>
-            <a:normAutofit/>
+            <a:normAutofit lnSpcReduction="10000"/>
           </a:bodyPr>
           <a:lstStyle/>
           <a:p>
@@ -8467,13 +8467,74 @@
             </a:r>
             <a:r>
               <a:rPr lang="en-US" dirty="0"/>
-              <a:t> into master. </a:t>
-            </a:r>
-          </a:p>
-          <a:p>
-            <a:r>
-              <a:rPr lang="en-US" dirty="0"/>
-              <a:t>This signifies that the feature is done to the best of your knowledge. There may still be unexpected bugs, but you should do most of your testing before it’s in master.</a:t>
+              <a:t> into </a:t>
+            </a:r>
+            <a:r>
+              <a:rPr lang="en-US" i="1" dirty="0"/>
+              <a:t>master</a:t>
+            </a:r>
+            <a:r>
+              <a:rPr lang="en-US" dirty="0"/>
+              <a:t>. </a:t>
+            </a:r>
+          </a:p>
+          <a:p>
+            <a:r>
+              <a:rPr lang="en-US" dirty="0"/>
+              <a:t>This signifies that the feature is done to the best of your knowledge. There may still be unexpected bugs, but you should do most of your testing before it’s in </a:t>
+            </a:r>
+            <a:r>
+              <a:rPr lang="en-US" i="1" dirty="0"/>
+              <a:t>master</a:t>
+            </a:r>
+            <a:r>
+              <a:rPr lang="en-US" dirty="0"/>
+              <a:t>.</a:t>
+            </a:r>
+          </a:p>
+          <a:p>
+            <a:r>
+              <a:rPr lang="en-US" dirty="0"/>
+              <a:t>The idea is that </a:t>
+            </a:r>
+            <a:r>
+              <a:rPr lang="en-US" i="1" dirty="0"/>
+              <a:t>master</a:t>
+            </a:r>
+            <a:r>
+              <a:rPr lang="en-US" dirty="0"/>
+              <a:t> should represent an </a:t>
+            </a:r>
+            <a:r>
+              <a:rPr lang="en-US" b="1" dirty="0"/>
+              <a:t>always working </a:t>
+            </a:r>
+            <a:r>
+              <a:rPr lang="en-US" dirty="0"/>
+              <a:t>copy of the project. </a:t>
+            </a:r>
+          </a:p>
+          <a:p>
+            <a:pPr lvl="1"/>
+            <a:r>
+              <a:rPr lang="en-US" dirty="0"/>
+              <a:t>I.e. if someone important shows up and wants to see something </a:t>
+            </a:r>
+            <a:r>
+              <a:rPr lang="en-US" b="1" dirty="0"/>
+              <a:t>right now</a:t>
+            </a:r>
+            <a:r>
+              <a:rPr lang="en-US" dirty="0"/>
+              <a:t>, you should always be able to switch to </a:t>
+            </a:r>
+            <a:r>
+              <a:rPr lang="en-US" i="1" dirty="0"/>
+              <a:t>master</a:t>
+            </a:r>
+            <a:r>
+              <a:rPr lang="en-US" dirty="0"/>
+              <a:t> and build it without a problem.</a:t>
             </a:r>
           </a:p>
         </p:txBody>
@@ -8660,18 +8721,29 @@
         </p:nvSpPr>
         <p:spPr/>
         <p:txBody>
-          <a:bodyPr/>
-          <a:lstStyle/>
-          <a:p>
-            <a:r>
-              <a:rPr lang="en-US" dirty="0"/>
-              <a:t>Before anything else:</a:t>
-            </a:r>
-          </a:p>
-          <a:p>
-            <a:r>
-              <a:rPr lang="en-US" dirty="0"/>
-              <a:t>If you are using Unity, save yourself a lot of merge-related headache and heartache by setting up Unity’s </a:t>
+          <a:bodyPr>
+            <a:normAutofit/>
+          </a:bodyPr>
+          <a:lstStyle/>
+          <a:p>
+            <a:r>
+              <a:rPr lang="en-US" dirty="0"/>
+              <a:t>Before anything else, </a:t>
+            </a:r>
+            <a:r>
+              <a:rPr lang="en-US" b="1" dirty="0"/>
+              <a:t>if you are using Unity</a:t>
+            </a:r>
+            <a:r>
+              <a:rPr lang="en-US" dirty="0"/>
+              <a:t>:</a:t>
+            </a:r>
+          </a:p>
+          <a:p>
+            <a:pPr lvl="1"/>
+            <a:r>
+              <a:rPr lang="en-US" dirty="0"/>
+              <a:t>On any computer you use, make sure you save yourself a lot of merge-related headache and heartache by setting up Unity’s </a:t>
             </a:r>
             <a:r>
               <a:rPr lang="en-US" dirty="0" err="1"/>
@@ -8683,6 +8755,7 @@
             </a:r>
           </a:p>
           <a:p>
+            <a:pPr lvl="1"/>
             <a:r>
               <a:rPr lang="en-US" dirty="0"/>
               <a:t>A step-by-step for hooking that up with SourceTree can be found at </a:t>
@@ -8696,6 +8769,31 @@
             <a:r>
               <a:rPr lang="en-US" dirty="0"/>
               <a:t>.</a:t>
+            </a:r>
+          </a:p>
+          <a:p>
+            <a:pPr lvl="1"/>
+            <a:r>
+              <a:rPr lang="en-US" dirty="0"/>
+              <a:t>Please note that in order for </a:t>
+            </a:r>
+            <a:r>
+              <a:rPr lang="en-US" dirty="0" err="1"/>
+              <a:t>SmartMerge</a:t>
+            </a:r>
+            <a:r>
+              <a:rPr lang="en-US" dirty="0"/>
+              <a:t> to work, your Unity project must already be </a:t>
+            </a:r>
+            <a:r>
+              <a:rPr lang="en-US" dirty="0">
+                <a:hlinkClick r:id="rId3"/>
+              </a:rPr>
+              <a:t>configured to work with git</a:t>
+            </a:r>
+            <a:r>
+              <a:rPr lang="en-US" dirty="0"/>
+              <a:t>. Luckily, that only needs to be done once at the very start of your project.</a:t>
             </a:r>
           </a:p>
         </p:txBody>

</xml_diff>

<commit_message>
Clarify wording on "resolve using mine"  versus "resolve using theirs"
</commit_message>
<xml_diff>
--- a/Understanding Git.pptx
+++ b/Understanding Git.pptx
@@ -9217,7 +9217,7 @@
         <p:spPr/>
         <p:txBody>
           <a:bodyPr>
-            <a:normAutofit fontScale="77500" lnSpcReduction="20000"/>
+            <a:normAutofit fontScale="70000" lnSpcReduction="20000"/>
           </a:bodyPr>
           <a:lstStyle/>
           <a:p>
@@ -9243,7 +9243,7 @@
             </a:r>
             <a:r>
               <a:rPr lang="en-US" dirty="0"/>
-              <a:t> will discard whatever changes were in the other commit/branch.</a:t>
+              <a:t> will discard whatever changes were in the commit/branch you’re merging in.</a:t>
             </a:r>
           </a:p>
           <a:p>
@@ -9258,7 +9258,7 @@
             </a:r>
             <a:r>
               <a:rPr lang="en-US" dirty="0"/>
-              <a:t> will discard whatever changes were made in the commit/branch you’re currently on.</a:t>
+              <a:t> will discard whatever changes were in the commit/branch you’re merging into.</a:t>
             </a:r>
           </a:p>
           <a:p>
@@ -9281,6 +9281,11 @@
             </a:r>
           </a:p>
           <a:p>
+            <a:pPr>
+              <a:spcAft>
+                <a:spcPts val="0"/>
+              </a:spcAft>
+            </a:pPr>
             <a:r>
               <a:rPr lang="en-US" dirty="0"/>
               <a:t>If it’s a Unity file and you </a:t>

</xml_diff>

<commit_message>
Rework commit footnote to more clearly indicate the relevancy of the information.
</commit_message>
<xml_diff>
--- a/Understanding Git.pptx
+++ b/Understanding Git.pptx
@@ -10415,24 +10415,42 @@
         </p:nvSpPr>
         <p:spPr/>
         <p:txBody>
-          <a:bodyPr/>
-          <a:lstStyle/>
-          <a:p>
-            <a:r>
-              <a:rPr lang="en-US" dirty="0"/>
-              <a:t>Well, technically that’s not true.</a:t>
-            </a:r>
-          </a:p>
-          <a:p>
-            <a:r>
-              <a:rPr lang="en-US" dirty="0"/>
-              <a:t>In actuality, commits can be subdivided into trees. Then those trees can be broken down into more trees, and so on, until eventually you reach blobs which are the smallest atomic unit in git.</a:t>
-            </a:r>
-          </a:p>
-          <a:p>
-            <a:r>
-              <a:rPr lang="en-US" dirty="0"/>
-              <a:t>Really though, the structure git uses to store information isn’t hugely relevant to this piece. If you want to read more about it, check out the relevant parts of </a:t>
+          <a:bodyPr>
+            <a:normAutofit lnSpcReduction="10000"/>
+          </a:bodyPr>
+          <a:lstStyle/>
+          <a:p>
+            <a:r>
+              <a:rPr lang="en-US" dirty="0"/>
+              <a:t>Well, </a:t>
+            </a:r>
+            <a:r>
+              <a:rPr lang="en-US" b="1" dirty="0"/>
+              <a:t>technically</a:t>
+            </a:r>
+            <a:r>
+              <a:rPr lang="en-US" dirty="0"/>
+              <a:t> that’s not true.</a:t>
+            </a:r>
+          </a:p>
+          <a:p>
+            <a:r>
+              <a:rPr lang="en-US" dirty="0"/>
+              <a:t>The structure git uses to store information isn’t hugely relevant to this piece, but if you’re curious:</a:t>
+            </a:r>
+          </a:p>
+          <a:p>
+            <a:pPr lvl="1"/>
+            <a:r>
+              <a:rPr lang="en-US" dirty="0"/>
+              <a:t>In actuality, commits can be subdivided into trees. Then those trees can be broken down into more trees, and so on, until eventually you reach blobs which are the smallest atomic unit in git. Blobs are how git stores actual data.</a:t>
+            </a:r>
+          </a:p>
+          <a:p>
+            <a:pPr lvl="1"/>
+            <a:r>
+              <a:rPr lang="en-US" dirty="0"/>
+              <a:t>If you want to read more about it, check out the relevant parts of </a:t>
             </a:r>
             <a:r>
               <a:rPr lang="en-US" dirty="0">

</xml_diff>